<commit_message>
Pflichtenheft_EvalPro_final.docx - kleinere Anpassungen Praesentation_Pflichtenheft_Gruppe7.pptx - Erstellt
</commit_message>
<xml_diff>
--- a/docs/Praesentationen/Praesentation_Pflichtenheft_Gruppe7.pptx
+++ b/docs/Praesentationen/Praesentation_Pflichtenheft_Gruppe7.pptx
@@ -30413,7 +30413,7 @@
             <p:ph idx="1"/>
             <p:extLst>
               <p:ext uri="{D42A27DB-BD31-4B8C-83A1-F6EECF244321}">
-                <p14:modId xmlns:p14="http://schemas.microsoft.com/office/powerpoint/2010/main" val="3853966210"/>
+                <p14:modId xmlns:p14="http://schemas.microsoft.com/office/powerpoint/2010/main" val="3787027342"/>
               </p:ext>
             </p:extLst>
           </p:nvPr>
@@ -30620,7 +30620,7 @@
                             <a:sysClr val="windowText" lastClr="000000"/>
                           </a:solidFill>
                         </a:rPr>
-                        <a:t>Damion Dirrigl</a:t>
+                        <a:t>Damien Dirrigl</a:t>
                       </a:r>
                     </a:p>
                   </a:txBody>

</xml_diff>

<commit_message>
Praesentation_Pflichtenheft_Gruppe7.pptx - Kleinere Anpassungen am Text und ergänzung von Überschrift
</commit_message>
<xml_diff>
--- a/docs/Praesentationen/Praesentation_Pflichtenheft_Gruppe7.pptx
+++ b/docs/Praesentationen/Praesentation_Pflichtenheft_Gruppe7.pptx
@@ -1,9 +1,12 @@
 
 <file path=ppt/presentation.xml><?xml version="1.0" encoding="utf-8"?>
-<p:presentation xmlns:a="http://schemas.openxmlformats.org/drawingml/2006/main" xmlns:r="http://schemas.openxmlformats.org/officeDocument/2006/relationships" xmlns:p="http://schemas.openxmlformats.org/presentationml/2006/main" saveSubsetFonts="1">
+<p:presentation xmlns:a="http://schemas.openxmlformats.org/drawingml/2006/main" xmlns:r="http://schemas.openxmlformats.org/officeDocument/2006/relationships" xmlns:p="http://schemas.openxmlformats.org/presentationml/2006/main" showSpecialPlsOnTitleSld="0" saveSubsetFonts="1">
   <p:sldMasterIdLst>
     <p:sldMasterId id="2147483660" r:id="rId1"/>
   </p:sldMasterIdLst>
+  <p:notesMasterIdLst>
+    <p:notesMasterId r:id="rId35"/>
+  </p:notesMasterIdLst>
   <p:sldIdLst>
     <p:sldId id="256" r:id="rId2"/>
     <p:sldId id="257" r:id="rId3"/>
@@ -36,6 +39,8 @@
     <p:sldId id="286" r:id="rId30"/>
     <p:sldId id="287" r:id="rId31"/>
     <p:sldId id="288" r:id="rId32"/>
+    <p:sldId id="289" r:id="rId33"/>
+    <p:sldId id="290" r:id="rId34"/>
   </p:sldIdLst>
   <p:sldSz cx="12192000" cy="6858000"/>
   <p:notesSz cx="6858000" cy="9144000"/>
@@ -24438,6 +24443,355 @@
 </dgm:styleDef>
 </file>
 
+<file path=ppt/notesMasters/notesMaster1.xml><?xml version="1.0" encoding="utf-8"?>
+<p:notesMaster xmlns:a="http://schemas.openxmlformats.org/drawingml/2006/main" xmlns:r="http://schemas.openxmlformats.org/officeDocument/2006/relationships" xmlns:p="http://schemas.openxmlformats.org/presentationml/2006/main">
+  <p:cSld>
+    <p:bg>
+      <p:bgRef idx="1001">
+        <a:schemeClr val="bg1"/>
+      </p:bgRef>
+    </p:bg>
+    <p:spTree>
+      <p:nvGrpSpPr>
+        <p:cNvPr id="1" name=""/>
+        <p:cNvGrpSpPr/>
+        <p:nvPr/>
+      </p:nvGrpSpPr>
+      <p:grpSpPr>
+        <a:xfrm>
+          <a:off x="0" y="0"/>
+          <a:ext cx="0" cy="0"/>
+          <a:chOff x="0" y="0"/>
+          <a:chExt cx="0" cy="0"/>
+        </a:xfrm>
+      </p:grpSpPr>
+      <p:sp>
+        <p:nvSpPr>
+          <p:cNvPr id="2" name="Kopfzeilenplatzhalter 1"/>
+          <p:cNvSpPr>
+            <a:spLocks noGrp="1"/>
+          </p:cNvSpPr>
+          <p:nvPr>
+            <p:ph type="hdr" sz="quarter"/>
+          </p:nvPr>
+        </p:nvSpPr>
+        <p:spPr>
+          <a:xfrm>
+            <a:off x="0" y="0"/>
+            <a:ext cx="2971800" cy="458788"/>
+          </a:xfrm>
+          <a:prstGeom prst="rect">
+            <a:avLst/>
+          </a:prstGeom>
+        </p:spPr>
+        <p:txBody>
+          <a:bodyPr vert="horz" lIns="91440" tIns="45720" rIns="91440" bIns="45720" rtlCol="0"/>
+          <a:lstStyle>
+            <a:lvl1pPr algn="l">
+              <a:defRPr sz="1200"/>
+            </a:lvl1pPr>
+          </a:lstStyle>
+          <a:p>
+            <a:endParaRPr lang="de-DE"/>
+          </a:p>
+        </p:txBody>
+      </p:sp>
+      <p:sp>
+        <p:nvSpPr>
+          <p:cNvPr id="3" name="Datumsplatzhalter 2"/>
+          <p:cNvSpPr>
+            <a:spLocks noGrp="1"/>
+          </p:cNvSpPr>
+          <p:nvPr>
+            <p:ph type="dt" idx="1"/>
+          </p:nvPr>
+        </p:nvSpPr>
+        <p:spPr>
+          <a:xfrm>
+            <a:off x="3884613" y="0"/>
+            <a:ext cx="2971800" cy="458788"/>
+          </a:xfrm>
+          <a:prstGeom prst="rect">
+            <a:avLst/>
+          </a:prstGeom>
+        </p:spPr>
+        <p:txBody>
+          <a:bodyPr vert="horz" lIns="91440" tIns="45720" rIns="91440" bIns="45720" rtlCol="0"/>
+          <a:lstStyle>
+            <a:lvl1pPr algn="r">
+              <a:defRPr sz="1200"/>
+            </a:lvl1pPr>
+          </a:lstStyle>
+          <a:p>
+            <a:fld id="{B3FE248F-650F-49E6-B974-4247CB460A65}" type="datetimeFigureOut">
+              <a:rPr lang="de-DE" smtClean="0"/>
+              <a:t>08.11.2025</a:t>
+            </a:fld>
+            <a:endParaRPr lang="de-DE"/>
+          </a:p>
+        </p:txBody>
+      </p:sp>
+      <p:sp>
+        <p:nvSpPr>
+          <p:cNvPr id="4" name="Folienbildplatzhalter 3"/>
+          <p:cNvSpPr>
+            <a:spLocks noGrp="1" noRot="1" noChangeAspect="1"/>
+          </p:cNvSpPr>
+          <p:nvPr>
+            <p:ph type="sldImg" idx="2"/>
+          </p:nvPr>
+        </p:nvSpPr>
+        <p:spPr>
+          <a:xfrm>
+            <a:off x="685800" y="1143000"/>
+            <a:ext cx="5486400" cy="3086100"/>
+          </a:xfrm>
+          <a:prstGeom prst="rect">
+            <a:avLst/>
+          </a:prstGeom>
+          <a:noFill/>
+          <a:ln w="12700">
+            <a:solidFill>
+              <a:prstClr val="black"/>
+            </a:solidFill>
+          </a:ln>
+        </p:spPr>
+        <p:txBody>
+          <a:bodyPr vert="horz" lIns="91440" tIns="45720" rIns="91440" bIns="45720" rtlCol="0" anchor="ctr"/>
+          <a:lstStyle/>
+          <a:p>
+            <a:endParaRPr lang="de-DE"/>
+          </a:p>
+        </p:txBody>
+      </p:sp>
+      <p:sp>
+        <p:nvSpPr>
+          <p:cNvPr id="5" name="Notizenplatzhalter 4"/>
+          <p:cNvSpPr>
+            <a:spLocks noGrp="1"/>
+          </p:cNvSpPr>
+          <p:nvPr>
+            <p:ph type="body" sz="quarter" idx="3"/>
+          </p:nvPr>
+        </p:nvSpPr>
+        <p:spPr>
+          <a:xfrm>
+            <a:off x="685800" y="4400550"/>
+            <a:ext cx="5486400" cy="3600450"/>
+          </a:xfrm>
+          <a:prstGeom prst="rect">
+            <a:avLst/>
+          </a:prstGeom>
+        </p:spPr>
+        <p:txBody>
+          <a:bodyPr vert="horz" lIns="91440" tIns="45720" rIns="91440" bIns="45720" rtlCol="0"/>
+          <a:lstStyle/>
+          <a:p>
+            <a:pPr lvl="0"/>
+            <a:r>
+              <a:rPr lang="de-DE"/>
+              <a:t>Mastertextformat bearbeiten</a:t>
+            </a:r>
+          </a:p>
+          <a:p>
+            <a:pPr lvl="1"/>
+            <a:r>
+              <a:rPr lang="de-DE"/>
+              <a:t>Zweite Ebene</a:t>
+            </a:r>
+          </a:p>
+          <a:p>
+            <a:pPr lvl="2"/>
+            <a:r>
+              <a:rPr lang="de-DE"/>
+              <a:t>Dritte Ebene</a:t>
+            </a:r>
+          </a:p>
+          <a:p>
+            <a:pPr lvl="3"/>
+            <a:r>
+              <a:rPr lang="de-DE"/>
+              <a:t>Vierte Ebene</a:t>
+            </a:r>
+          </a:p>
+          <a:p>
+            <a:pPr lvl="4"/>
+            <a:r>
+              <a:rPr lang="de-DE"/>
+              <a:t>Fünfte Ebene</a:t>
+            </a:r>
+          </a:p>
+        </p:txBody>
+      </p:sp>
+      <p:sp>
+        <p:nvSpPr>
+          <p:cNvPr id="6" name="Fußzeilenplatzhalter 5"/>
+          <p:cNvSpPr>
+            <a:spLocks noGrp="1"/>
+          </p:cNvSpPr>
+          <p:nvPr>
+            <p:ph type="ftr" sz="quarter" idx="4"/>
+          </p:nvPr>
+        </p:nvSpPr>
+        <p:spPr>
+          <a:xfrm>
+            <a:off x="0" y="8685213"/>
+            <a:ext cx="2971800" cy="458787"/>
+          </a:xfrm>
+          <a:prstGeom prst="rect">
+            <a:avLst/>
+          </a:prstGeom>
+        </p:spPr>
+        <p:txBody>
+          <a:bodyPr vert="horz" lIns="91440" tIns="45720" rIns="91440" bIns="45720" rtlCol="0" anchor="b"/>
+          <a:lstStyle>
+            <a:lvl1pPr algn="l">
+              <a:defRPr sz="1200"/>
+            </a:lvl1pPr>
+          </a:lstStyle>
+          <a:p>
+            <a:endParaRPr lang="de-DE"/>
+          </a:p>
+        </p:txBody>
+      </p:sp>
+      <p:sp>
+        <p:nvSpPr>
+          <p:cNvPr id="7" name="Foliennummernplatzhalter 6"/>
+          <p:cNvSpPr>
+            <a:spLocks noGrp="1"/>
+          </p:cNvSpPr>
+          <p:nvPr>
+            <p:ph type="sldNum" sz="quarter" idx="5"/>
+          </p:nvPr>
+        </p:nvSpPr>
+        <p:spPr>
+          <a:xfrm>
+            <a:off x="3884613" y="8685213"/>
+            <a:ext cx="2971800" cy="458787"/>
+          </a:xfrm>
+          <a:prstGeom prst="rect">
+            <a:avLst/>
+          </a:prstGeom>
+        </p:spPr>
+        <p:txBody>
+          <a:bodyPr vert="horz" lIns="91440" tIns="45720" rIns="91440" bIns="45720" rtlCol="0" anchor="b"/>
+          <a:lstStyle>
+            <a:lvl1pPr algn="r">
+              <a:defRPr sz="1200"/>
+            </a:lvl1pPr>
+          </a:lstStyle>
+          <a:p>
+            <a:fld id="{B3F06221-1369-4EB0-9AD1-DEFFF903C54B}" type="slidenum">
+              <a:rPr lang="de-DE" smtClean="0"/>
+              <a:t>‹Nr.›</a:t>
+            </a:fld>
+            <a:endParaRPr lang="de-DE"/>
+          </a:p>
+        </p:txBody>
+      </p:sp>
+    </p:spTree>
+    <p:extLst>
+      <p:ext uri="{BB962C8B-B14F-4D97-AF65-F5344CB8AC3E}">
+        <p14:creationId xmlns:p14="http://schemas.microsoft.com/office/powerpoint/2010/main" val="25448019"/>
+      </p:ext>
+    </p:extLst>
+  </p:cSld>
+  <p:clrMap bg1="lt1" tx1="dk1" bg2="lt2" tx2="dk2" accent1="accent1" accent2="accent2" accent3="accent3" accent4="accent4" accent5="accent5" accent6="accent6" hlink="hlink" folHlink="folHlink"/>
+  <p:notesStyle>
+    <a:lvl1pPr marL="0" algn="l" defTabSz="914400" rtl="0" eaLnBrk="1" latinLnBrk="0" hangingPunct="1">
+      <a:defRPr sz="1200" kern="1200">
+        <a:solidFill>
+          <a:schemeClr val="tx1"/>
+        </a:solidFill>
+        <a:latin typeface="+mn-lt"/>
+        <a:ea typeface="+mn-ea"/>
+        <a:cs typeface="+mn-cs"/>
+      </a:defRPr>
+    </a:lvl1pPr>
+    <a:lvl2pPr marL="457200" algn="l" defTabSz="914400" rtl="0" eaLnBrk="1" latinLnBrk="0" hangingPunct="1">
+      <a:defRPr sz="1200" kern="1200">
+        <a:solidFill>
+          <a:schemeClr val="tx1"/>
+        </a:solidFill>
+        <a:latin typeface="+mn-lt"/>
+        <a:ea typeface="+mn-ea"/>
+        <a:cs typeface="+mn-cs"/>
+      </a:defRPr>
+    </a:lvl2pPr>
+    <a:lvl3pPr marL="914400" algn="l" defTabSz="914400" rtl="0" eaLnBrk="1" latinLnBrk="0" hangingPunct="1">
+      <a:defRPr sz="1200" kern="1200">
+        <a:solidFill>
+          <a:schemeClr val="tx1"/>
+        </a:solidFill>
+        <a:latin typeface="+mn-lt"/>
+        <a:ea typeface="+mn-ea"/>
+        <a:cs typeface="+mn-cs"/>
+      </a:defRPr>
+    </a:lvl3pPr>
+    <a:lvl4pPr marL="1371600" algn="l" defTabSz="914400" rtl="0" eaLnBrk="1" latinLnBrk="0" hangingPunct="1">
+      <a:defRPr sz="1200" kern="1200">
+        <a:solidFill>
+          <a:schemeClr val="tx1"/>
+        </a:solidFill>
+        <a:latin typeface="+mn-lt"/>
+        <a:ea typeface="+mn-ea"/>
+        <a:cs typeface="+mn-cs"/>
+      </a:defRPr>
+    </a:lvl4pPr>
+    <a:lvl5pPr marL="1828800" algn="l" defTabSz="914400" rtl="0" eaLnBrk="1" latinLnBrk="0" hangingPunct="1">
+      <a:defRPr sz="1200" kern="1200">
+        <a:solidFill>
+          <a:schemeClr val="tx1"/>
+        </a:solidFill>
+        <a:latin typeface="+mn-lt"/>
+        <a:ea typeface="+mn-ea"/>
+        <a:cs typeface="+mn-cs"/>
+      </a:defRPr>
+    </a:lvl5pPr>
+    <a:lvl6pPr marL="2286000" algn="l" defTabSz="914400" rtl="0" eaLnBrk="1" latinLnBrk="0" hangingPunct="1">
+      <a:defRPr sz="1200" kern="1200">
+        <a:solidFill>
+          <a:schemeClr val="tx1"/>
+        </a:solidFill>
+        <a:latin typeface="+mn-lt"/>
+        <a:ea typeface="+mn-ea"/>
+        <a:cs typeface="+mn-cs"/>
+      </a:defRPr>
+    </a:lvl6pPr>
+    <a:lvl7pPr marL="2743200" algn="l" defTabSz="914400" rtl="0" eaLnBrk="1" latinLnBrk="0" hangingPunct="1">
+      <a:defRPr sz="1200" kern="1200">
+        <a:solidFill>
+          <a:schemeClr val="tx1"/>
+        </a:solidFill>
+        <a:latin typeface="+mn-lt"/>
+        <a:ea typeface="+mn-ea"/>
+        <a:cs typeface="+mn-cs"/>
+      </a:defRPr>
+    </a:lvl7pPr>
+    <a:lvl8pPr marL="3200400" algn="l" defTabSz="914400" rtl="0" eaLnBrk="1" latinLnBrk="0" hangingPunct="1">
+      <a:defRPr sz="1200" kern="1200">
+        <a:solidFill>
+          <a:schemeClr val="tx1"/>
+        </a:solidFill>
+        <a:latin typeface="+mn-lt"/>
+        <a:ea typeface="+mn-ea"/>
+        <a:cs typeface="+mn-cs"/>
+      </a:defRPr>
+    </a:lvl8pPr>
+    <a:lvl9pPr marL="3657600" algn="l" defTabSz="914400" rtl="0" eaLnBrk="1" latinLnBrk="0" hangingPunct="1">
+      <a:defRPr sz="1200" kern="1200">
+        <a:solidFill>
+          <a:schemeClr val="tx1"/>
+        </a:solidFill>
+        <a:latin typeface="+mn-lt"/>
+        <a:ea typeface="+mn-ea"/>
+        <a:cs typeface="+mn-cs"/>
+      </a:defRPr>
+    </a:lvl9pPr>
+  </p:notesStyle>
+</p:notesMaster>
+</file>
+
 <file path=ppt/slideLayouts/slideLayout1.xml><?xml version="1.0" encoding="utf-8"?>
 <p:sldLayout xmlns:a="http://schemas.openxmlformats.org/drawingml/2006/main" xmlns:r="http://schemas.openxmlformats.org/officeDocument/2006/relationships" xmlns:p="http://schemas.openxmlformats.org/presentationml/2006/main" preserve="1">
   <p:cSld name="Titelfolie">
@@ -26635,7 +26989,7 @@
         </p:blipFill>
         <p:spPr>
           <a:xfrm>
-            <a:off x="11493817" y="6167658"/>
+            <a:off x="10863509" y="6167658"/>
             <a:ext cx="664569" cy="664569"/>
           </a:xfrm>
           <a:prstGeom prst="rect">
@@ -26657,7 +27011,7 @@
         </p:nvSpPr>
         <p:spPr>
           <a:xfrm>
-            <a:off x="8665369" y="6218692"/>
+            <a:off x="8070566" y="6218692"/>
             <a:ext cx="2758440" cy="646331"/>
           </a:xfrm>
           <a:prstGeom prst="rect">
@@ -26721,7 +27075,7 @@
           </a:bodyPr>
           <a:lstStyle/>
           <a:p>
-            <a:fld id="{C06966BB-24CC-4DE8-AB9A-3D6ADDF56B3E}" type="slidenum">
+            <a:fld id="{417AB090-9AD4-4C22-B55E-5C99405ACDD8}" type="slidenum">
               <a:rPr lang="de-DE" smtClean="0"/>
               <a:t>‹Nr.›</a:t>
             </a:fld>
@@ -26729,6 +27083,38 @@
           </a:p>
         </p:txBody>
       </p:sp>
+      <p:pic>
+        <p:nvPicPr>
+          <p:cNvPr id="6" name="Grafik 5">
+            <a:extLst>
+              <a:ext uri="{FF2B5EF4-FFF2-40B4-BE49-F238E27FC236}">
+                <a16:creationId xmlns:a16="http://schemas.microsoft.com/office/drawing/2014/main" id="{48927EBC-CA55-2B43-283F-F21AA2F6AB13}"/>
+              </a:ext>
+            </a:extLst>
+          </p:cNvPr>
+          <p:cNvPicPr>
+            <a:picLocks noChangeAspect="1"/>
+          </p:cNvPicPr>
+          <p:nvPr userDrawn="1"/>
+        </p:nvPicPr>
+        <p:blipFill>
+          <a:blip r:embed="rId14"/>
+          <a:stretch/>
+        </p:blipFill>
+        <p:spPr bwMode="auto">
+          <a:xfrm>
+            <a:off x="11553767" y="6149551"/>
+            <a:ext cx="638233" cy="664569"/>
+          </a:xfrm>
+          <a:prstGeom prst="rect">
+            <a:avLst/>
+          </a:prstGeom>
+          <a:noFill/>
+          <a:ln>
+            <a:noFill/>
+          </a:ln>
+        </p:spPr>
+      </p:pic>
     </p:spTree>
     <p:extLst>
       <p:ext uri="{BB962C8B-B14F-4D97-AF65-F5344CB8AC3E}">
@@ -26750,6 +27136,7 @@
     <p:sldLayoutId id="2147483670" r:id="rId10"/>
     <p:sldLayoutId id="2147483671" r:id="rId11"/>
   </p:sldLayoutIdLst>
+  <p:hf sldNum="0" hdr="0" ftr="0" dt="0"/>
   <p:txStyles>
     <p:titleStyle>
       <a:lvl1pPr algn="l" defTabSz="914400" rtl="0" eaLnBrk="1" latinLnBrk="0" hangingPunct="1">
@@ -27158,12 +27545,19 @@
             <a:spLocks noGrp="1"/>
           </p:cNvSpPr>
           <p:nvPr>
-            <p:ph type="title"/>
+            <p:ph type="ctrTitle"/>
           </p:nvPr>
         </p:nvSpPr>
-        <p:spPr/>
+        <p:spPr>
+          <a:xfrm>
+            <a:off x="1524000" y="1122363"/>
+            <a:ext cx="9144000" cy="2387600"/>
+          </a:xfrm>
+        </p:spPr>
         <p:txBody>
-          <a:bodyPr/>
+          <a:bodyPr anchor="b">
+            <a:normAutofit/>
+          </a:bodyPr>
           <a:lstStyle/>
           <a:p>
             <a:r>
@@ -27186,12 +27580,19 @@
             <a:spLocks noGrp="1"/>
           </p:cNvSpPr>
           <p:nvPr>
-            <p:ph idx="1"/>
+            <p:ph type="subTitle" idx="1"/>
           </p:nvPr>
         </p:nvSpPr>
-        <p:spPr/>
+        <p:spPr>
+          <a:xfrm>
+            <a:off x="1524000" y="3602038"/>
+            <a:ext cx="9144000" cy="1655762"/>
+          </a:xfrm>
+        </p:spPr>
         <p:txBody>
-          <a:bodyPr/>
+          <a:bodyPr>
+            <a:normAutofit/>
+          </a:bodyPr>
           <a:lstStyle/>
           <a:p>
             <a:pPr marL="0" indent="0">
@@ -28952,8 +29353,8 @@
               <a:buNone/>
             </a:pPr>
             <a:r>
-              <a:rPr lang="de-DE" sz="2200"/>
-              <a:t>Alle Anwendungen haben eine ansprechende, benutzerfreundliche GUI bereitzustellen, die nach den Interaktionsprinzipien der DIN EN ISO 9241-110 gestaltet ist. Sie hat alle funktionalen Anforderungen abzudecken, eine komfortable Bedienung mit Maus und Tastatur zu ermöglichen und ein positives Nutzungserlebnis sicherzustellen.</a:t>
+              <a:rPr lang="de-DE" sz="2200" dirty="0"/>
+              <a:t>Alle Anwendungen stellen eine ansprechende, benutzerfreundliche GUI bereit, die nach den Interaktionsprinzipien der DIN EN ISO 9241-110 gestaltet ist. Sie deckt alle funktionalen Anforderungen ab, eine komfortable Bedienung mit Maus und Tastatur ist gegeben und ein positives Nutzungserlebnis ist sichergestellt.</a:t>
             </a:r>
           </a:p>
         </p:txBody>
@@ -29055,8 +29456,8 @@
               <a:buNone/>
             </a:pPr>
             <a:r>
-              <a:rPr lang="de-DE" sz="2200"/>
-              <a:t>Der Quellcode ist klar strukturiert und modular aufgebaut, um eine schnelle Einarbeitung zu ermöglichen. Die Softwarearchitektur ist einfach zu gestalten, sodass insbesondere Anpassungen an der Notenberechnung schnell und unkompliziert durchgeführt werden können.</a:t>
+              <a:rPr lang="de-DE" sz="2200" dirty="0"/>
+              <a:t>Der Quellcode ist klar strukturiert und modular aufgebaut, um eine schnelle Einarbeitung zu ermöglichen. Die Softwarearchitektur ist einfach gestaltet, sodass insbesondere Anpassungen an der Notenberechnung schnell und unkompliziert durchgeführt werden können.</a:t>
             </a:r>
           </a:p>
         </p:txBody>
@@ -29159,7 +29560,7 @@
             </a:pPr>
             <a:r>
               <a:rPr lang="de-DE" dirty="0"/>
-              <a:t>Das Softwaredesign ist der Corporate Identity der Stadt Regensburg und der Berufsschule III anzupassen. Es ist ansprechend und funktional zu gestalten.</a:t>
+              <a:t>Das Softwaredesign ist der Corporate Identity der Stadt Regensburg und der Berufsschule III angepasst. Es ist ansprechend und funktional gestaltet.</a:t>
             </a:r>
           </a:p>
           <a:p>
@@ -29401,7 +29802,7 @@
             </a:pPr>
             <a:r>
               <a:rPr lang="de-DE" dirty="0"/>
-              <a:t>Das Projekt umfasst 51,5 Personentage und wird durch drei Entwickler umgesetzt</a:t>
+              <a:t>Das Projekt umfasst 51,5 Personentage und wird durch vier Entwickler umgesetzt</a:t>
             </a:r>
           </a:p>
         </p:txBody>
@@ -30152,7 +30553,7 @@
         </p:blipFill>
         <p:spPr>
           <a:xfrm>
-            <a:off x="2302449" y="68263"/>
+            <a:off x="1639057" y="139983"/>
             <a:ext cx="7168679" cy="6595184"/>
           </a:xfrm>
           <a:prstGeom prst="rect">
@@ -30165,6 +30566,818 @@
     <p:extLst>
       <p:ext uri="{BB962C8B-B14F-4D97-AF65-F5344CB8AC3E}">
         <p14:creationId xmlns:p14="http://schemas.microsoft.com/office/powerpoint/2010/main" val="2590761066"/>
+      </p:ext>
+    </p:extLst>
+  </p:cSld>
+  <p:clrMapOvr>
+    <a:masterClrMapping/>
+  </p:clrMapOvr>
+</p:sld>
+</file>
+
+<file path=ppt/slides/slide32.xml><?xml version="1.0" encoding="utf-8"?>
+<p:sld xmlns:a="http://schemas.openxmlformats.org/drawingml/2006/main" xmlns:r="http://schemas.openxmlformats.org/officeDocument/2006/relationships" xmlns:p="http://schemas.openxmlformats.org/presentationml/2006/main">
+  <p:cSld>
+    <p:spTree>
+      <p:nvGrpSpPr>
+        <p:cNvPr id="1" name=""/>
+        <p:cNvGrpSpPr/>
+        <p:nvPr/>
+      </p:nvGrpSpPr>
+      <p:grpSpPr>
+        <a:xfrm>
+          <a:off x="0" y="0"/>
+          <a:ext cx="0" cy="0"/>
+          <a:chOff x="0" y="0"/>
+          <a:chExt cx="0" cy="0"/>
+        </a:xfrm>
+      </p:grpSpPr>
+      <p:sp>
+        <p:nvSpPr>
+          <p:cNvPr id="2" name="Titel 1">
+            <a:extLst>
+              <a:ext uri="{FF2B5EF4-FFF2-40B4-BE49-F238E27FC236}">
+                <a16:creationId xmlns:a16="http://schemas.microsoft.com/office/drawing/2014/main" id="{4AFAA6F0-E351-CDA6-8573-7190C01D7631}"/>
+              </a:ext>
+            </a:extLst>
+          </p:cNvPr>
+          <p:cNvSpPr>
+            <a:spLocks noGrp="1"/>
+          </p:cNvSpPr>
+          <p:nvPr>
+            <p:ph type="title"/>
+          </p:nvPr>
+        </p:nvSpPr>
+        <p:spPr/>
+        <p:txBody>
+          <a:bodyPr/>
+          <a:lstStyle/>
+          <a:p>
+            <a:r>
+              <a:rPr lang="de-DE" dirty="0"/>
+              <a:t>Glossar</a:t>
+            </a:r>
+          </a:p>
+        </p:txBody>
+      </p:sp>
+      <p:graphicFrame>
+        <p:nvGraphicFramePr>
+          <p:cNvPr id="4" name="Inhaltsplatzhalter 3">
+            <a:extLst>
+              <a:ext uri="{FF2B5EF4-FFF2-40B4-BE49-F238E27FC236}">
+                <a16:creationId xmlns:a16="http://schemas.microsoft.com/office/drawing/2014/main" id="{21997D43-E8C9-675A-8C44-E4B7BFB3D81F}"/>
+              </a:ext>
+            </a:extLst>
+          </p:cNvPr>
+          <p:cNvGraphicFramePr>
+            <a:graphicFrameLocks noGrp="1"/>
+          </p:cNvGraphicFramePr>
+          <p:nvPr>
+            <p:ph idx="1"/>
+            <p:extLst>
+              <p:ext uri="{D42A27DB-BD31-4B8C-83A1-F6EECF244321}">
+                <p14:modId xmlns:p14="http://schemas.microsoft.com/office/powerpoint/2010/main" val="203322148"/>
+              </p:ext>
+            </p:extLst>
+          </p:nvPr>
+        </p:nvGraphicFramePr>
+        <p:xfrm>
+          <a:off x="757518" y="1551940"/>
+          <a:ext cx="10515600" cy="3754120"/>
+        </p:xfrm>
+        <a:graphic>
+          <a:graphicData uri="http://schemas.openxmlformats.org/drawingml/2006/table">
+            <a:tbl>
+              <a:tblPr firstRow="1" bandRow="1">
+                <a:tableStyleId>{5C22544A-7EE6-4342-B048-85BDC9FD1C3A}</a:tableStyleId>
+              </a:tblPr>
+              <a:tblGrid>
+                <a:gridCol w="5257800">
+                  <a:extLst>
+                    <a:ext uri="{9D8B030D-6E8A-4147-A177-3AD203B41FA5}">
+                      <a16:colId xmlns:a16="http://schemas.microsoft.com/office/drawing/2014/main" val="3927344807"/>
+                    </a:ext>
+                  </a:extLst>
+                </a:gridCol>
+                <a:gridCol w="5257800">
+                  <a:extLst>
+                    <a:ext uri="{9D8B030D-6E8A-4147-A177-3AD203B41FA5}">
+                      <a16:colId xmlns:a16="http://schemas.microsoft.com/office/drawing/2014/main" val="1387347342"/>
+                    </a:ext>
+                  </a:extLst>
+                </a:gridCol>
+              </a:tblGrid>
+              <a:tr h="370840">
+                <a:tc>
+                  <a:txBody>
+                    <a:bodyPr/>
+                    <a:lstStyle/>
+                    <a:p>
+                      <a:r>
+                        <a:rPr lang="de-DE" dirty="0"/>
+                        <a:t>Formulierung</a:t>
+                      </a:r>
+                    </a:p>
+                  </a:txBody>
+                  <a:tcPr/>
+                </a:tc>
+                <a:tc>
+                  <a:txBody>
+                    <a:bodyPr/>
+                    <a:lstStyle/>
+                    <a:p>
+                      <a:r>
+                        <a:rPr lang="de-DE" dirty="0"/>
+                        <a:t>Beschreibung</a:t>
+                      </a:r>
+                    </a:p>
+                  </a:txBody>
+                  <a:tcPr/>
+                </a:tc>
+                <a:extLst>
+                  <a:ext uri="{0D108BD9-81ED-4DB2-BD59-A6C34878D82A}">
+                    <a16:rowId xmlns:a16="http://schemas.microsoft.com/office/drawing/2014/main" val="531275605"/>
+                  </a:ext>
+                </a:extLst>
+              </a:tr>
+              <a:tr h="370840">
+                <a:tc>
+                  <a:txBody>
+                    <a:bodyPr/>
+                    <a:lstStyle/>
+                    <a:p>
+                      <a:r>
+                        <a:rPr lang="de-DE" dirty="0"/>
+                        <a:t>DSGVO-konform</a:t>
+                      </a:r>
+                    </a:p>
+                  </a:txBody>
+                  <a:tcPr/>
+                </a:tc>
+                <a:tc>
+                  <a:txBody>
+                    <a:bodyPr/>
+                    <a:lstStyle/>
+                    <a:p>
+                      <a:r>
+                        <a:rPr lang="de-DE" dirty="0"/>
+                        <a:t>Die Software speichert und verarbeitet personenbezogene Daten gemäß den Vorgaben der Datenschutz-Grundverordnung (DSGVO)</a:t>
+                      </a:r>
+                    </a:p>
+                  </a:txBody>
+                  <a:tcPr/>
+                </a:tc>
+                <a:extLst>
+                  <a:ext uri="{0D108BD9-81ED-4DB2-BD59-A6C34878D82A}">
+                    <a16:rowId xmlns:a16="http://schemas.microsoft.com/office/drawing/2014/main" val="2852195618"/>
+                  </a:ext>
+                </a:extLst>
+              </a:tr>
+              <a:tr h="370840">
+                <a:tc>
+                  <a:txBody>
+                    <a:bodyPr/>
+                    <a:lstStyle/>
+                    <a:p>
+                      <a:r>
+                        <a:rPr lang="de-DE" dirty="0"/>
+                        <a:t>DIN EN ISO 9241-110</a:t>
+                      </a:r>
+                    </a:p>
+                  </a:txBody>
+                  <a:tcPr/>
+                </a:tc>
+                <a:tc>
+                  <a:txBody>
+                    <a:bodyPr/>
+                    <a:lstStyle/>
+                    <a:p>
+                      <a:r>
+                        <a:rPr lang="de-DE" dirty="0"/>
+                        <a:t>Die DIN-Norm definiert ergonomische Grundsätze für die Gestaltung von Benutzungsschnittstellen (grafische Benutzeroberfläche)</a:t>
+                      </a:r>
+                    </a:p>
+                  </a:txBody>
+                  <a:tcPr/>
+                </a:tc>
+                <a:extLst>
+                  <a:ext uri="{0D108BD9-81ED-4DB2-BD59-A6C34878D82A}">
+                    <a16:rowId xmlns:a16="http://schemas.microsoft.com/office/drawing/2014/main" val="500700731"/>
+                  </a:ext>
+                </a:extLst>
+              </a:tr>
+              <a:tr h="370840">
+                <a:tc>
+                  <a:txBody>
+                    <a:bodyPr/>
+                    <a:lstStyle/>
+                    <a:p>
+                      <a:r>
+                        <a:rPr lang="de-DE" dirty="0"/>
+                        <a:t>Corporate Identity</a:t>
+                      </a:r>
+                    </a:p>
+                  </a:txBody>
+                  <a:tcPr/>
+                </a:tc>
+                <a:tc>
+                  <a:txBody>
+                    <a:bodyPr/>
+                    <a:lstStyle/>
+                    <a:p>
+                      <a:r>
+                        <a:rPr lang="de-DE" dirty="0"/>
+                        <a:t>Beschreibt das einheitliche Erscheinungsbild einer Organisation, dies spiegelt sich in Design, Sprache und Verhalten wider</a:t>
+                      </a:r>
+                    </a:p>
+                  </a:txBody>
+                  <a:tcPr/>
+                </a:tc>
+                <a:extLst>
+                  <a:ext uri="{0D108BD9-81ED-4DB2-BD59-A6C34878D82A}">
+                    <a16:rowId xmlns:a16="http://schemas.microsoft.com/office/drawing/2014/main" val="2562799486"/>
+                  </a:ext>
+                </a:extLst>
+              </a:tr>
+              <a:tr h="370840">
+                <a:tc>
+                  <a:txBody>
+                    <a:bodyPr/>
+                    <a:lstStyle/>
+                    <a:p>
+                      <a:r>
+                        <a:rPr lang="de-DE" dirty="0"/>
+                        <a:t>(Web)-Link</a:t>
+                      </a:r>
+                    </a:p>
+                  </a:txBody>
+                  <a:tcPr/>
+                </a:tc>
+                <a:tc>
+                  <a:txBody>
+                    <a:bodyPr/>
+                    <a:lstStyle/>
+                    <a:p>
+                      <a:r>
+                        <a:rPr lang="de-DE" dirty="0"/>
+                        <a:t>Dies ist eine Verknüpfung ins Internet, um auf Webseiten / Informationen zuzugreifen</a:t>
+                      </a:r>
+                    </a:p>
+                  </a:txBody>
+                  <a:tcPr/>
+                </a:tc>
+                <a:extLst>
+                  <a:ext uri="{0D108BD9-81ED-4DB2-BD59-A6C34878D82A}">
+                    <a16:rowId xmlns:a16="http://schemas.microsoft.com/office/drawing/2014/main" val="287188481"/>
+                  </a:ext>
+                </a:extLst>
+              </a:tr>
+            </a:tbl>
+          </a:graphicData>
+        </a:graphic>
+      </p:graphicFrame>
+    </p:spTree>
+    <p:extLst>
+      <p:ext uri="{BB962C8B-B14F-4D97-AF65-F5344CB8AC3E}">
+        <p14:creationId xmlns:p14="http://schemas.microsoft.com/office/powerpoint/2010/main" val="2470416119"/>
+      </p:ext>
+    </p:extLst>
+  </p:cSld>
+  <p:clrMapOvr>
+    <a:masterClrMapping/>
+  </p:clrMapOvr>
+</p:sld>
+</file>
+
+<file path=ppt/slides/slide33.xml><?xml version="1.0" encoding="utf-8"?>
+<p:sld xmlns:a="http://schemas.openxmlformats.org/drawingml/2006/main" xmlns:r="http://schemas.openxmlformats.org/officeDocument/2006/relationships" xmlns:p="http://schemas.openxmlformats.org/presentationml/2006/main">
+  <p:cSld>
+    <p:spTree>
+      <p:nvGrpSpPr>
+        <p:cNvPr id="1" name=""/>
+        <p:cNvGrpSpPr/>
+        <p:nvPr/>
+      </p:nvGrpSpPr>
+      <p:grpSpPr>
+        <a:xfrm>
+          <a:off x="0" y="0"/>
+          <a:ext cx="0" cy="0"/>
+          <a:chOff x="0" y="0"/>
+          <a:chExt cx="0" cy="0"/>
+        </a:xfrm>
+      </p:grpSpPr>
+      <p:sp>
+        <p:nvSpPr>
+          <p:cNvPr id="2" name="Titel 1">
+            <a:extLst>
+              <a:ext uri="{FF2B5EF4-FFF2-40B4-BE49-F238E27FC236}">
+                <a16:creationId xmlns:a16="http://schemas.microsoft.com/office/drawing/2014/main" id="{121D3058-7FE7-7C40-B62F-68DC862780E3}"/>
+              </a:ext>
+            </a:extLst>
+          </p:cNvPr>
+          <p:cNvSpPr>
+            <a:spLocks noGrp="1"/>
+          </p:cNvSpPr>
+          <p:nvPr>
+            <p:ph type="title"/>
+          </p:nvPr>
+        </p:nvSpPr>
+        <p:spPr/>
+        <p:txBody>
+          <a:bodyPr/>
+          <a:lstStyle/>
+          <a:p>
+            <a:r>
+              <a:rPr lang="de-DE" dirty="0"/>
+              <a:t>Glossar</a:t>
+            </a:r>
+          </a:p>
+        </p:txBody>
+      </p:sp>
+      <p:graphicFrame>
+        <p:nvGraphicFramePr>
+          <p:cNvPr id="4" name="Inhaltsplatzhalter 3">
+            <a:extLst>
+              <a:ext uri="{FF2B5EF4-FFF2-40B4-BE49-F238E27FC236}">
+                <a16:creationId xmlns:a16="http://schemas.microsoft.com/office/drawing/2014/main" id="{0E6309BB-AD13-A3A2-488F-F926CB274C70}"/>
+              </a:ext>
+            </a:extLst>
+          </p:cNvPr>
+          <p:cNvGraphicFramePr>
+            <a:graphicFrameLocks noGrp="1"/>
+          </p:cNvGraphicFramePr>
+          <p:nvPr>
+            <p:ph idx="1"/>
+            <p:extLst>
+              <p:ext uri="{D42A27DB-BD31-4B8C-83A1-F6EECF244321}">
+                <p14:modId xmlns:p14="http://schemas.microsoft.com/office/powerpoint/2010/main" val="1633425053"/>
+              </p:ext>
+            </p:extLst>
+          </p:nvPr>
+        </p:nvGraphicFramePr>
+        <p:xfrm>
+          <a:off x="367551" y="1308847"/>
+          <a:ext cx="11232778" cy="4776395"/>
+        </p:xfrm>
+        <a:graphic>
+          <a:graphicData uri="http://schemas.openxmlformats.org/drawingml/2006/table">
+            <a:tbl>
+              <a:tblPr firstRow="1" bandRow="1">
+                <a:tableStyleId>{5C22544A-7EE6-4342-B048-85BDC9FD1C3A}</a:tableStyleId>
+              </a:tblPr>
+              <a:tblGrid>
+                <a:gridCol w="5616389">
+                  <a:extLst>
+                    <a:ext uri="{9D8B030D-6E8A-4147-A177-3AD203B41FA5}">
+                      <a16:colId xmlns:a16="http://schemas.microsoft.com/office/drawing/2014/main" val="408970351"/>
+                    </a:ext>
+                  </a:extLst>
+                </a:gridCol>
+                <a:gridCol w="5616389">
+                  <a:extLst>
+                    <a:ext uri="{9D8B030D-6E8A-4147-A177-3AD203B41FA5}">
+                      <a16:colId xmlns:a16="http://schemas.microsoft.com/office/drawing/2014/main" val="167026262"/>
+                    </a:ext>
+                  </a:extLst>
+                </a:gridCol>
+              </a:tblGrid>
+              <a:tr h="364543">
+                <a:tc>
+                  <a:txBody>
+                    <a:bodyPr/>
+                    <a:lstStyle/>
+                    <a:p>
+                      <a:r>
+                        <a:rPr lang="de-DE" dirty="0"/>
+                        <a:t>Abkürzungen/Objekte</a:t>
+                      </a:r>
+                    </a:p>
+                  </a:txBody>
+                  <a:tcPr/>
+                </a:tc>
+                <a:tc>
+                  <a:txBody>
+                    <a:bodyPr/>
+                    <a:lstStyle/>
+                    <a:p>
+                      <a:r>
+                        <a:rPr lang="de-DE" dirty="0"/>
+                        <a:t>Bedeutung</a:t>
+                      </a:r>
+                    </a:p>
+                  </a:txBody>
+                  <a:tcPr/>
+                </a:tc>
+                <a:extLst>
+                  <a:ext uri="{0D108BD9-81ED-4DB2-BD59-A6C34878D82A}">
+                    <a16:rowId xmlns:a16="http://schemas.microsoft.com/office/drawing/2014/main" val="2429528698"/>
+                  </a:ext>
+                </a:extLst>
+              </a:tr>
+              <a:tr h="911357">
+                <a:tc>
+                  <a:txBody>
+                    <a:bodyPr/>
+                    <a:lstStyle/>
+                    <a:p>
+                      <a:r>
+                        <a:rPr lang="de-DE" dirty="0" err="1"/>
+                        <a:t>EvalPro</a:t>
+                      </a:r>
+                      <a:endParaRPr lang="de-DE" dirty="0"/>
+                    </a:p>
+                    <a:p>
+                      <a:r>
+                        <a:rPr lang="de-DE" dirty="0"/>
+                        <a:t>IHK</a:t>
+                      </a:r>
+                    </a:p>
+                    <a:p>
+                      <a:r>
+                        <a:rPr lang="de-DE" dirty="0"/>
+                        <a:t>DSGVO</a:t>
+                      </a:r>
+                    </a:p>
+                  </a:txBody>
+                  <a:tcPr/>
+                </a:tc>
+                <a:tc>
+                  <a:txBody>
+                    <a:bodyPr/>
+                    <a:lstStyle/>
+                    <a:p>
+                      <a:r>
+                        <a:rPr lang="de-DE" dirty="0"/>
+                        <a:t>Professionelles </a:t>
+                      </a:r>
+                      <a:r>
+                        <a:rPr lang="de-DE" dirty="0" err="1"/>
+                        <a:t>PrüferInnenwerkzeug</a:t>
+                      </a:r>
+                      <a:endParaRPr lang="de-DE" dirty="0"/>
+                    </a:p>
+                    <a:p>
+                      <a:r>
+                        <a:rPr lang="de-DE" dirty="0"/>
+                        <a:t>Industrie- und Handelskammer</a:t>
+                      </a:r>
+                    </a:p>
+                    <a:p>
+                      <a:r>
+                        <a:rPr lang="de-DE" dirty="0"/>
+                        <a:t>Datenschutz-Grundverordnung</a:t>
+                      </a:r>
+                    </a:p>
+                  </a:txBody>
+                  <a:tcPr/>
+                </a:tc>
+                <a:extLst>
+                  <a:ext uri="{0D108BD9-81ED-4DB2-BD59-A6C34878D82A}">
+                    <a16:rowId xmlns:a16="http://schemas.microsoft.com/office/drawing/2014/main" val="1994244538"/>
+                  </a:ext>
+                </a:extLst>
+              </a:tr>
+              <a:tr h="387275">
+                <a:tc>
+                  <a:txBody>
+                    <a:bodyPr/>
+                    <a:lstStyle/>
+                    <a:p>
+                      <a:r>
+                        <a:rPr lang="de-DE" dirty="0"/>
+                        <a:t>GUI</a:t>
+                      </a:r>
+                    </a:p>
+                  </a:txBody>
+                  <a:tcPr/>
+                </a:tc>
+                <a:tc>
+                  <a:txBody>
+                    <a:bodyPr/>
+                    <a:lstStyle/>
+                    <a:p>
+                      <a:pPr marL="0" marR="0" lvl="0" indent="0" algn="l" defTabSz="914400" rtl="0" eaLnBrk="1" fontAlgn="auto" latinLnBrk="0" hangingPunct="1">
+                        <a:lnSpc>
+                          <a:spcPct val="100000"/>
+                        </a:lnSpc>
+                        <a:spcBef>
+                          <a:spcPts val="0"/>
+                        </a:spcBef>
+                        <a:spcAft>
+                          <a:spcPts val="0"/>
+                        </a:spcAft>
+                        <a:buClrTx/>
+                        <a:buSzTx/>
+                        <a:buFontTx/>
+                        <a:buNone/>
+                        <a:tabLst/>
+                        <a:defRPr/>
+                      </a:pPr>
+                      <a:r>
+                        <a:rPr lang="de-DE" dirty="0"/>
+                        <a:t>Grafische Benutzeroberfläche (</a:t>
+                      </a:r>
+                      <a:r>
+                        <a:rPr lang="de-DE" dirty="0" err="1"/>
+                        <a:t>graphical</a:t>
+                      </a:r>
+                      <a:r>
+                        <a:rPr lang="de-DE" dirty="0"/>
+                        <a:t> </a:t>
+                      </a:r>
+                      <a:r>
+                        <a:rPr lang="de-DE" dirty="0" err="1"/>
+                        <a:t>user</a:t>
+                      </a:r>
+                      <a:r>
+                        <a:rPr lang="de-DE" dirty="0"/>
+                        <a:t> interface)</a:t>
+                      </a:r>
+                    </a:p>
+                  </a:txBody>
+                  <a:tcPr/>
+                </a:tc>
+                <a:extLst>
+                  <a:ext uri="{0D108BD9-81ED-4DB2-BD59-A6C34878D82A}">
+                    <a16:rowId xmlns:a16="http://schemas.microsoft.com/office/drawing/2014/main" val="1287805672"/>
+                  </a:ext>
+                </a:extLst>
+              </a:tr>
+              <a:tr h="911357">
+                <a:tc>
+                  <a:txBody>
+                    <a:bodyPr/>
+                    <a:lstStyle/>
+                    <a:p>
+                      <a:r>
+                        <a:rPr lang="de-DE" dirty="0"/>
+                        <a:t>DIN</a:t>
+                      </a:r>
+                    </a:p>
+                    <a:p>
+                      <a:r>
+                        <a:rPr lang="de-DE" dirty="0"/>
+                        <a:t>EN</a:t>
+                      </a:r>
+                    </a:p>
+                    <a:p>
+                      <a:r>
+                        <a:rPr lang="de-DE" dirty="0"/>
+                        <a:t>ISO</a:t>
+                      </a:r>
+                    </a:p>
+                  </a:txBody>
+                  <a:tcPr/>
+                </a:tc>
+                <a:tc>
+                  <a:txBody>
+                    <a:bodyPr/>
+                    <a:lstStyle/>
+                    <a:p>
+                      <a:r>
+                        <a:rPr lang="de-DE" dirty="0"/>
+                        <a:t>Deutsches Institut für Normung</a:t>
+                      </a:r>
+                    </a:p>
+                    <a:p>
+                      <a:r>
+                        <a:rPr lang="de-DE" dirty="0"/>
+                        <a:t>Europäische Norm</a:t>
+                      </a:r>
+                    </a:p>
+                    <a:p>
+                      <a:r>
+                        <a:rPr lang="de-DE" dirty="0"/>
+                        <a:t>Internationale Organisation für Normung</a:t>
+                      </a:r>
+                    </a:p>
+                  </a:txBody>
+                  <a:tcPr/>
+                </a:tc>
+                <a:extLst>
+                  <a:ext uri="{0D108BD9-81ED-4DB2-BD59-A6C34878D82A}">
+                    <a16:rowId xmlns:a16="http://schemas.microsoft.com/office/drawing/2014/main" val="2620110343"/>
+                  </a:ext>
+                </a:extLst>
+              </a:tr>
+              <a:tr h="364543">
+                <a:tc>
+                  <a:txBody>
+                    <a:bodyPr/>
+                    <a:lstStyle/>
+                    <a:p>
+                      <a:r>
+                        <a:rPr lang="de-DE" dirty="0"/>
+                        <a:t>KW</a:t>
+                      </a:r>
+                    </a:p>
+                  </a:txBody>
+                  <a:tcPr/>
+                </a:tc>
+                <a:tc>
+                  <a:txBody>
+                    <a:bodyPr/>
+                    <a:lstStyle/>
+                    <a:p>
+                      <a:r>
+                        <a:rPr lang="de-DE" dirty="0"/>
+                        <a:t>Kalenderwoche</a:t>
+                      </a:r>
+                    </a:p>
+                  </a:txBody>
+                  <a:tcPr/>
+                </a:tc>
+                <a:extLst>
+                  <a:ext uri="{0D108BD9-81ED-4DB2-BD59-A6C34878D82A}">
+                    <a16:rowId xmlns:a16="http://schemas.microsoft.com/office/drawing/2014/main" val="475865708"/>
+                  </a:ext>
+                </a:extLst>
+              </a:tr>
+              <a:tr h="364543">
+                <a:tc>
+                  <a:txBody>
+                    <a:bodyPr/>
+                    <a:lstStyle/>
+                    <a:p>
+                      <a:r>
+                        <a:rPr lang="de-DE" dirty="0"/>
+                        <a:t>PC</a:t>
+                      </a:r>
+                    </a:p>
+                  </a:txBody>
+                  <a:tcPr/>
+                </a:tc>
+                <a:tc>
+                  <a:txBody>
+                    <a:bodyPr/>
+                    <a:lstStyle/>
+                    <a:p>
+                      <a:r>
+                        <a:rPr lang="de-DE" dirty="0"/>
+                        <a:t>Personal Computer</a:t>
+                      </a:r>
+                    </a:p>
+                  </a:txBody>
+                  <a:tcPr/>
+                </a:tc>
+                <a:extLst>
+                  <a:ext uri="{0D108BD9-81ED-4DB2-BD59-A6C34878D82A}">
+                    <a16:rowId xmlns:a16="http://schemas.microsoft.com/office/drawing/2014/main" val="34826673"/>
+                  </a:ext>
+                </a:extLst>
+              </a:tr>
+              <a:tr h="364543">
+                <a:tc>
+                  <a:txBody>
+                    <a:bodyPr/>
+                    <a:lstStyle/>
+                    <a:p>
+                      <a:r>
+                        <a:rPr lang="de-DE" dirty="0"/>
+                        <a:t>GB</a:t>
+                      </a:r>
+                    </a:p>
+                  </a:txBody>
+                  <a:tcPr/>
+                </a:tc>
+                <a:tc>
+                  <a:txBody>
+                    <a:bodyPr/>
+                    <a:lstStyle/>
+                    <a:p>
+                      <a:r>
+                        <a:rPr lang="de-DE" dirty="0"/>
+                        <a:t>Gigabyte</a:t>
+                      </a:r>
+                    </a:p>
+                  </a:txBody>
+                  <a:tcPr/>
+                </a:tc>
+                <a:extLst>
+                  <a:ext uri="{0D108BD9-81ED-4DB2-BD59-A6C34878D82A}">
+                    <a16:rowId xmlns:a16="http://schemas.microsoft.com/office/drawing/2014/main" val="2636603364"/>
+                  </a:ext>
+                </a:extLst>
+              </a:tr>
+              <a:tr h="364543">
+                <a:tc>
+                  <a:txBody>
+                    <a:bodyPr/>
+                    <a:lstStyle/>
+                    <a:p>
+                      <a:r>
+                        <a:rPr lang="de-DE" dirty="0"/>
+                        <a:t>RAM</a:t>
+                      </a:r>
+                    </a:p>
+                  </a:txBody>
+                  <a:tcPr/>
+                </a:tc>
+                <a:tc>
+                  <a:txBody>
+                    <a:bodyPr/>
+                    <a:lstStyle/>
+                    <a:p>
+                      <a:r>
+                        <a:rPr lang="de-DE" dirty="0"/>
+                        <a:t>Random-Access-Memory</a:t>
+                      </a:r>
+                    </a:p>
+                  </a:txBody>
+                  <a:tcPr/>
+                </a:tc>
+                <a:extLst>
+                  <a:ext uri="{0D108BD9-81ED-4DB2-BD59-A6C34878D82A}">
+                    <a16:rowId xmlns:a16="http://schemas.microsoft.com/office/drawing/2014/main" val="3786170784"/>
+                  </a:ext>
+                </a:extLst>
+              </a:tr>
+              <a:tr h="364543">
+                <a:tc>
+                  <a:txBody>
+                    <a:bodyPr/>
+                    <a:lstStyle/>
+                    <a:p>
+                      <a:r>
+                        <a:rPr lang="de-DE" dirty="0"/>
+                        <a:t>API</a:t>
+                      </a:r>
+                    </a:p>
+                  </a:txBody>
+                  <a:tcPr/>
+                </a:tc>
+                <a:tc>
+                  <a:txBody>
+                    <a:bodyPr/>
+                    <a:lstStyle/>
+                    <a:p>
+                      <a:r>
+                        <a:rPr lang="de-DE" dirty="0" err="1"/>
+                        <a:t>Application</a:t>
+                      </a:r>
+                      <a:r>
+                        <a:rPr lang="de-DE" dirty="0"/>
+                        <a:t> </a:t>
+                      </a:r>
+                      <a:r>
+                        <a:rPr lang="de-DE" dirty="0" err="1"/>
+                        <a:t>Programming</a:t>
+                      </a:r>
+                      <a:r>
+                        <a:rPr lang="de-DE" dirty="0"/>
+                        <a:t> Interface</a:t>
+                      </a:r>
+                    </a:p>
+                  </a:txBody>
+                  <a:tcPr/>
+                </a:tc>
+                <a:extLst>
+                  <a:ext uri="{0D108BD9-81ED-4DB2-BD59-A6C34878D82A}">
+                    <a16:rowId xmlns:a16="http://schemas.microsoft.com/office/drawing/2014/main" val="1150800802"/>
+                  </a:ext>
+                </a:extLst>
+              </a:tr>
+              <a:tr h="364543">
+                <a:tc>
+                  <a:txBody>
+                    <a:bodyPr/>
+                    <a:lstStyle/>
+                    <a:p>
+                      <a:r>
+                        <a:rPr lang="de-DE" dirty="0"/>
+                        <a:t>CI</a:t>
+                      </a:r>
+                    </a:p>
+                  </a:txBody>
+                  <a:tcPr/>
+                </a:tc>
+                <a:tc>
+                  <a:txBody>
+                    <a:bodyPr/>
+                    <a:lstStyle/>
+                    <a:p>
+                      <a:r>
+                        <a:rPr lang="de-DE" dirty="0"/>
+                        <a:t>Corporate Identity</a:t>
+                      </a:r>
+                    </a:p>
+                  </a:txBody>
+                  <a:tcPr/>
+                </a:tc>
+                <a:extLst>
+                  <a:ext uri="{0D108BD9-81ED-4DB2-BD59-A6C34878D82A}">
+                    <a16:rowId xmlns:a16="http://schemas.microsoft.com/office/drawing/2014/main" val="1201565737"/>
+                  </a:ext>
+                </a:extLst>
+              </a:tr>
+            </a:tbl>
+          </a:graphicData>
+        </a:graphic>
+      </p:graphicFrame>
+    </p:spTree>
+    <p:extLst>
+      <p:ext uri="{BB962C8B-B14F-4D97-AF65-F5344CB8AC3E}">
+        <p14:creationId xmlns:p14="http://schemas.microsoft.com/office/powerpoint/2010/main" val="2438416129"/>
       </p:ext>
     </p:extLst>
   </p:cSld>
@@ -30392,7 +31605,7 @@
           <a:p>
             <a:r>
               <a:rPr lang="de-DE" dirty="0"/>
-              <a:t>01.03</a:t>
+              <a:t>01.03. Team</a:t>
             </a:r>
           </a:p>
         </p:txBody>
@@ -30413,7 +31626,7 @@
             <p:ph idx="1"/>
             <p:extLst>
               <p:ext uri="{D42A27DB-BD31-4B8C-83A1-F6EECF244321}">
-                <p14:modId xmlns:p14="http://schemas.microsoft.com/office/powerpoint/2010/main" val="3787027342"/>
+                <p14:modId xmlns:p14="http://schemas.microsoft.com/office/powerpoint/2010/main" val="1792367003"/>
               </p:ext>
             </p:extLst>
           </p:nvPr>
@@ -31410,4 +32623,319 @@
     </a:ext>
   </a:extLst>
 </a:theme>
+</file>
+
+<file path=ppt/theme/theme2.xml><?xml version="1.0" encoding="utf-8"?>
+<a:theme xmlns:a="http://schemas.openxmlformats.org/drawingml/2006/main" name="Office">
+  <a:themeElements>
+    <a:clrScheme name="Office">
+      <a:dk1>
+        <a:sysClr val="windowText" lastClr="000000"/>
+      </a:dk1>
+      <a:lt1>
+        <a:sysClr val="window" lastClr="FFFFFF"/>
+      </a:lt1>
+      <a:dk2>
+        <a:srgbClr val="0E2841"/>
+      </a:dk2>
+      <a:lt2>
+        <a:srgbClr val="E8E8E8"/>
+      </a:lt2>
+      <a:accent1>
+        <a:srgbClr val="156082"/>
+      </a:accent1>
+      <a:accent2>
+        <a:srgbClr val="E97132"/>
+      </a:accent2>
+      <a:accent3>
+        <a:srgbClr val="196B24"/>
+      </a:accent3>
+      <a:accent4>
+        <a:srgbClr val="0F9ED5"/>
+      </a:accent4>
+      <a:accent5>
+        <a:srgbClr val="A02B93"/>
+      </a:accent5>
+      <a:accent6>
+        <a:srgbClr val="4EA72E"/>
+      </a:accent6>
+      <a:hlink>
+        <a:srgbClr val="467886"/>
+      </a:hlink>
+      <a:folHlink>
+        <a:srgbClr val="96607D"/>
+      </a:folHlink>
+    </a:clrScheme>
+    <a:fontScheme name="Office">
+      <a:majorFont>
+        <a:latin typeface="Aptos Display" panose="02110004020202020204"/>
+        <a:ea typeface=""/>
+        <a:cs typeface=""/>
+        <a:font script="Jpan" typeface="游ゴシック Light"/>
+        <a:font script="Hang" typeface="맑은 고딕"/>
+        <a:font script="Hans" typeface="等线 Light"/>
+        <a:font script="Hant" typeface="新細明體"/>
+        <a:font script="Arab" typeface="Times New Roman"/>
+        <a:font script="Hebr" typeface="Times New Roman"/>
+        <a:font script="Thai" typeface="Angsana New"/>
+        <a:font script="Ethi" typeface="Nyala"/>
+        <a:font script="Beng" typeface="Vrinda"/>
+        <a:font script="Gujr" typeface="Shruti"/>
+        <a:font script="Khmr" typeface="MoolBoran"/>
+        <a:font script="Knda" typeface="Tunga"/>
+        <a:font script="Guru" typeface="Raavi"/>
+        <a:font script="Cans" typeface="Euphemia"/>
+        <a:font script="Cher" typeface="Plantagenet Cherokee"/>
+        <a:font script="Yiii" typeface="Microsoft Yi Baiti"/>
+        <a:font script="Tibt" typeface="Microsoft Himalaya"/>
+        <a:font script="Thaa" typeface="MV Boli"/>
+        <a:font script="Deva" typeface="Mangal"/>
+        <a:font script="Telu" typeface="Gautami"/>
+        <a:font script="Taml" typeface="Latha"/>
+        <a:font script="Syrc" typeface="Estrangelo Edessa"/>
+        <a:font script="Orya" typeface="Kalinga"/>
+        <a:font script="Mlym" typeface="Kartika"/>
+        <a:font script="Laoo" typeface="DokChampa"/>
+        <a:font script="Sinh" typeface="Iskoola Pota"/>
+        <a:font script="Mong" typeface="Mongolian Baiti"/>
+        <a:font script="Viet" typeface="Times New Roman"/>
+        <a:font script="Uigh" typeface="Microsoft Uighur"/>
+        <a:font script="Geor" typeface="Sylfaen"/>
+        <a:font script="Armn" typeface="Arial"/>
+        <a:font script="Bugi" typeface="Leelawadee UI"/>
+        <a:font script="Bopo" typeface="Microsoft JhengHei"/>
+        <a:font script="Java" typeface="Javanese Text"/>
+        <a:font script="Lisu" typeface="Segoe UI"/>
+        <a:font script="Mymr" typeface="Myanmar Text"/>
+        <a:font script="Nkoo" typeface="Ebrima"/>
+        <a:font script="Olck" typeface="Nirmala UI"/>
+        <a:font script="Osma" typeface="Ebrima"/>
+        <a:font script="Phag" typeface="Phagspa"/>
+        <a:font script="Syrn" typeface="Estrangelo Edessa"/>
+        <a:font script="Syrj" typeface="Estrangelo Edessa"/>
+        <a:font script="Syre" typeface="Estrangelo Edessa"/>
+        <a:font script="Sora" typeface="Nirmala UI"/>
+        <a:font script="Tale" typeface="Microsoft Tai Le"/>
+        <a:font script="Talu" typeface="Microsoft New Tai Lue"/>
+        <a:font script="Tfng" typeface="Ebrima"/>
+      </a:majorFont>
+      <a:minorFont>
+        <a:latin typeface="Aptos" panose="02110004020202020204"/>
+        <a:ea typeface=""/>
+        <a:cs typeface=""/>
+        <a:font script="Jpan" typeface="游ゴシック"/>
+        <a:font script="Hang" typeface="맑은 고딕"/>
+        <a:font script="Hans" typeface="等线"/>
+        <a:font script="Hant" typeface="新細明體"/>
+        <a:font script="Arab" typeface="Arial"/>
+        <a:font script="Hebr" typeface="Arial"/>
+        <a:font script="Thai" typeface="Cordia New"/>
+        <a:font script="Ethi" typeface="Nyala"/>
+        <a:font script="Beng" typeface="Vrinda"/>
+        <a:font script="Gujr" typeface="Shruti"/>
+        <a:font script="Khmr" typeface="DaunPenh"/>
+        <a:font script="Knda" typeface="Tunga"/>
+        <a:font script="Guru" typeface="Raavi"/>
+        <a:font script="Cans" typeface="Euphemia"/>
+        <a:font script="Cher" typeface="Plantagenet Cherokee"/>
+        <a:font script="Yiii" typeface="Microsoft Yi Baiti"/>
+        <a:font script="Tibt" typeface="Microsoft Himalaya"/>
+        <a:font script="Thaa" typeface="MV Boli"/>
+        <a:font script="Deva" typeface="Mangal"/>
+        <a:font script="Telu" typeface="Gautami"/>
+        <a:font script="Taml" typeface="Latha"/>
+        <a:font script="Syrc" typeface="Estrangelo Edessa"/>
+        <a:font script="Orya" typeface="Kalinga"/>
+        <a:font script="Mlym" typeface="Kartika"/>
+        <a:font script="Laoo" typeface="DokChampa"/>
+        <a:font script="Sinh" typeface="Iskoola Pota"/>
+        <a:font script="Mong" typeface="Mongolian Baiti"/>
+        <a:font script="Viet" typeface="Arial"/>
+        <a:font script="Uigh" typeface="Microsoft Uighur"/>
+        <a:font script="Geor" typeface="Sylfaen"/>
+        <a:font script="Armn" typeface="Arial"/>
+        <a:font script="Bugi" typeface="Leelawadee UI"/>
+        <a:font script="Bopo" typeface="Microsoft JhengHei"/>
+        <a:font script="Java" typeface="Javanese Text"/>
+        <a:font script="Lisu" typeface="Segoe UI"/>
+        <a:font script="Mymr" typeface="Myanmar Text"/>
+        <a:font script="Nkoo" typeface="Ebrima"/>
+        <a:font script="Olck" typeface="Nirmala UI"/>
+        <a:font script="Osma" typeface="Ebrima"/>
+        <a:font script="Phag" typeface="Phagspa"/>
+        <a:font script="Syrn" typeface="Estrangelo Edessa"/>
+        <a:font script="Syrj" typeface="Estrangelo Edessa"/>
+        <a:font script="Syre" typeface="Estrangelo Edessa"/>
+        <a:font script="Sora" typeface="Nirmala UI"/>
+        <a:font script="Tale" typeface="Microsoft Tai Le"/>
+        <a:font script="Talu" typeface="Microsoft New Tai Lue"/>
+        <a:font script="Tfng" typeface="Ebrima"/>
+      </a:minorFont>
+    </a:fontScheme>
+    <a:fmtScheme name="Office">
+      <a:fillStyleLst>
+        <a:solidFill>
+          <a:schemeClr val="phClr"/>
+        </a:solidFill>
+        <a:gradFill rotWithShape="1">
+          <a:gsLst>
+            <a:gs pos="0">
+              <a:schemeClr val="phClr">
+                <a:lumMod val="110000"/>
+                <a:satMod val="105000"/>
+                <a:tint val="67000"/>
+              </a:schemeClr>
+            </a:gs>
+            <a:gs pos="50000">
+              <a:schemeClr val="phClr">
+                <a:lumMod val="105000"/>
+                <a:satMod val="103000"/>
+                <a:tint val="73000"/>
+              </a:schemeClr>
+            </a:gs>
+            <a:gs pos="100000">
+              <a:schemeClr val="phClr">
+                <a:lumMod val="105000"/>
+                <a:satMod val="109000"/>
+                <a:tint val="81000"/>
+              </a:schemeClr>
+            </a:gs>
+          </a:gsLst>
+          <a:lin ang="5400000" scaled="0"/>
+        </a:gradFill>
+        <a:gradFill rotWithShape="1">
+          <a:gsLst>
+            <a:gs pos="0">
+              <a:schemeClr val="phClr">
+                <a:satMod val="103000"/>
+                <a:lumMod val="102000"/>
+                <a:tint val="94000"/>
+              </a:schemeClr>
+            </a:gs>
+            <a:gs pos="50000">
+              <a:schemeClr val="phClr">
+                <a:satMod val="110000"/>
+                <a:lumMod val="100000"/>
+                <a:shade val="100000"/>
+              </a:schemeClr>
+            </a:gs>
+            <a:gs pos="100000">
+              <a:schemeClr val="phClr">
+                <a:lumMod val="99000"/>
+                <a:satMod val="120000"/>
+                <a:shade val="78000"/>
+              </a:schemeClr>
+            </a:gs>
+          </a:gsLst>
+          <a:lin ang="5400000" scaled="0"/>
+        </a:gradFill>
+      </a:fillStyleLst>
+      <a:lnStyleLst>
+        <a:ln w="12700" cap="flat" cmpd="sng" algn="ctr">
+          <a:solidFill>
+            <a:schemeClr val="phClr"/>
+          </a:solidFill>
+          <a:prstDash val="solid"/>
+          <a:miter lim="800000"/>
+        </a:ln>
+        <a:ln w="19050" cap="flat" cmpd="sng" algn="ctr">
+          <a:solidFill>
+            <a:schemeClr val="phClr"/>
+          </a:solidFill>
+          <a:prstDash val="solid"/>
+          <a:miter lim="800000"/>
+        </a:ln>
+        <a:ln w="25400" cap="flat" cmpd="sng" algn="ctr">
+          <a:solidFill>
+            <a:schemeClr val="phClr"/>
+          </a:solidFill>
+          <a:prstDash val="solid"/>
+          <a:miter lim="800000"/>
+        </a:ln>
+      </a:lnStyleLst>
+      <a:effectStyleLst>
+        <a:effectStyle>
+          <a:effectLst/>
+        </a:effectStyle>
+        <a:effectStyle>
+          <a:effectLst/>
+        </a:effectStyle>
+        <a:effectStyle>
+          <a:effectLst>
+            <a:outerShdw blurRad="57150" dist="19050" dir="5400000" algn="ctr" rotWithShape="0">
+              <a:srgbClr val="000000">
+                <a:alpha val="63000"/>
+              </a:srgbClr>
+            </a:outerShdw>
+          </a:effectLst>
+        </a:effectStyle>
+      </a:effectStyleLst>
+      <a:bgFillStyleLst>
+        <a:solidFill>
+          <a:schemeClr val="phClr"/>
+        </a:solidFill>
+        <a:solidFill>
+          <a:schemeClr val="phClr">
+            <a:tint val="95000"/>
+            <a:satMod val="170000"/>
+          </a:schemeClr>
+        </a:solidFill>
+        <a:gradFill rotWithShape="1">
+          <a:gsLst>
+            <a:gs pos="0">
+              <a:schemeClr val="phClr">
+                <a:tint val="93000"/>
+                <a:satMod val="150000"/>
+                <a:shade val="98000"/>
+                <a:lumMod val="102000"/>
+              </a:schemeClr>
+            </a:gs>
+            <a:gs pos="50000">
+              <a:schemeClr val="phClr">
+                <a:tint val="98000"/>
+                <a:satMod val="130000"/>
+                <a:shade val="90000"/>
+                <a:lumMod val="103000"/>
+              </a:schemeClr>
+            </a:gs>
+            <a:gs pos="100000">
+              <a:schemeClr val="phClr">
+                <a:shade val="63000"/>
+                <a:satMod val="120000"/>
+              </a:schemeClr>
+            </a:gs>
+          </a:gsLst>
+          <a:lin ang="5400000" scaled="0"/>
+        </a:gradFill>
+      </a:bgFillStyleLst>
+    </a:fmtScheme>
+  </a:themeElements>
+  <a:objectDefaults>
+    <a:lnDef>
+      <a:spPr/>
+      <a:bodyPr/>
+      <a:lstStyle/>
+      <a:style>
+        <a:lnRef idx="2">
+          <a:schemeClr val="accent1"/>
+        </a:lnRef>
+        <a:fillRef idx="0">
+          <a:schemeClr val="accent1"/>
+        </a:fillRef>
+        <a:effectRef idx="1">
+          <a:schemeClr val="accent1"/>
+        </a:effectRef>
+        <a:fontRef idx="minor">
+          <a:schemeClr val="tx1"/>
+        </a:fontRef>
+      </a:style>
+    </a:lnDef>
+  </a:objectDefaults>
+  <a:extraClrSchemeLst/>
+  <a:extLst>
+    <a:ext uri="{05A4C25C-085E-4340-85A3-A5531E510DB2}">
+      <thm15:themeFamily xmlns:thm15="http://schemas.microsoft.com/office/thememl/2012/main" name="Office Theme" id="{2E142A2C-CD16-42D6-873A-C26D2A0506FA}" vid="{1BDDFF52-6CD6-40A5-AB3C-68EB2F1E4D0A}"/>
+    </a:ext>
+  </a:extLst>
+</a:theme>
 </file>
</xml_diff>